<commit_message>
[NOBTS] Add the script structure ppt
</commit_message>
<xml_diff>
--- a/docs/ngrinder_script_structure.pptx
+++ b/docs/ngrinder_script_structure.pptx
@@ -4785,12 +4785,8 @@
           <a:p>
             <a:pPr algn="ctr"/>
             <a:r>
-              <a:rPr lang="en-US" altLang="ko-KR" sz="1400" dirty="0" err="1" smtClean="0"/>
+              <a:rPr lang="en-US" altLang="ko-KR" sz="1400" dirty="0" smtClean="0"/>
               <a:t>TestRunner</a:t>
-            </a:r>
-            <a:r>
-              <a:rPr lang="en-US" altLang="ko-KR" sz="1400" dirty="0" smtClean="0"/>
-              <a:t/>
             </a:r>
             <a:br>
               <a:rPr lang="en-US" altLang="ko-KR" sz="1400" dirty="0" smtClean="0"/>
@@ -4838,12 +4834,8 @@
           <a:p>
             <a:pPr algn="ctr"/>
             <a:r>
-              <a:rPr lang="en-US" altLang="ko-KR" sz="1400" dirty="0" err="1" smtClean="0"/>
+              <a:rPr lang="en-US" altLang="ko-KR" sz="1400" dirty="0" smtClean="0"/>
               <a:t>TestRunner</a:t>
-            </a:r>
-            <a:r>
-              <a:rPr lang="en-US" altLang="ko-KR" sz="1400" dirty="0" smtClean="0"/>
-              <a:t/>
             </a:r>
             <a:br>
               <a:rPr lang="en-US" altLang="ko-KR" sz="1400" dirty="0" smtClean="0"/>
@@ -5418,12 +5410,8 @@
           <a:p>
             <a:pPr algn="ctr"/>
             <a:r>
-              <a:rPr lang="en-US" altLang="ko-KR" sz="1400" dirty="0" err="1" smtClean="0"/>
-              <a:t>JythonScript</a:t>
-            </a:r>
-            <a:r>
               <a:rPr lang="en-US" altLang="ko-KR" sz="1400" dirty="0" smtClean="0"/>
-              <a:t> </a:t>
+              <a:t>JythonScript </a:t>
             </a:r>
             <a:r>
               <a:rPr lang="en-US" altLang="ko-KR" sz="1400" dirty="0" smtClean="0"/>

</xml_diff>